<commit_message>
M0078DDG-448 Fix .pptx and .png for hil4 (#333)
* M0078DDG-448 Fix .pptx and .png for hil4
* Update HIL3 image
</commit_message>
<xml_diff>
--- a/PlatformDeveloperGuide/images/hil3.pptx
+++ b/PlatformDeveloperGuide/images/hil3.pptx
@@ -145,7 +145,7 @@
           <p:cNvPr id="2" name="Title 1">
             <a:extLst>
               <a:ext uri="{FF2B5EF4-FFF2-40B4-BE49-F238E27FC236}">
-                <a16:creationId xmlns:a16="http://schemas.microsoft.com/office/drawing/2014/main" xmlns="" id="{50DDAD7A-8B52-4CAF-8C0A-F545DDC60746}"/>
+                <a16:creationId xmlns:a16="http://schemas.microsoft.com/office/drawing/2014/main" id="{50DDAD7A-8B52-4CAF-8C0A-F545DDC60746}"/>
               </a:ext>
             </a:extLst>
           </p:cNvPr>
@@ -183,7 +183,7 @@
           <p:cNvPr id="3" name="Subtitle 2">
             <a:extLst>
               <a:ext uri="{FF2B5EF4-FFF2-40B4-BE49-F238E27FC236}">
-                <a16:creationId xmlns:a16="http://schemas.microsoft.com/office/drawing/2014/main" xmlns="" id="{C4FF6F1C-0AF5-4CAD-A059-88F88E156187}"/>
+                <a16:creationId xmlns:a16="http://schemas.microsoft.com/office/drawing/2014/main" id="{C4FF6F1C-0AF5-4CAD-A059-88F88E156187}"/>
               </a:ext>
             </a:extLst>
           </p:cNvPr>
@@ -254,7 +254,7 @@
           <p:cNvPr id="4" name="Date Placeholder 3">
             <a:extLst>
               <a:ext uri="{FF2B5EF4-FFF2-40B4-BE49-F238E27FC236}">
-                <a16:creationId xmlns:a16="http://schemas.microsoft.com/office/drawing/2014/main" xmlns="" id="{4FEFC1E8-E09C-48A3-9D61-D187E1075B12}"/>
+                <a16:creationId xmlns:a16="http://schemas.microsoft.com/office/drawing/2014/main" id="{4FEFC1E8-E09C-48A3-9D61-D187E1075B12}"/>
               </a:ext>
             </a:extLst>
           </p:cNvPr>
@@ -272,7 +272,7 @@
           <a:p>
             <a:fld id="{CD63B9D5-DAC7-4B08-8CEE-404A79EB8B50}" type="datetimeFigureOut">
               <a:rPr lang="en-GB" smtClean="0"/>
-              <a:t>08/04/2020</a:t>
+              <a:t>04/11/2021</a:t>
             </a:fld>
             <a:endParaRPr lang="en-GB"/>
           </a:p>
@@ -283,7 +283,7 @@
           <p:cNvPr id="5" name="Footer Placeholder 4">
             <a:extLst>
               <a:ext uri="{FF2B5EF4-FFF2-40B4-BE49-F238E27FC236}">
-                <a16:creationId xmlns:a16="http://schemas.microsoft.com/office/drawing/2014/main" xmlns="" id="{1F4C4C04-B341-40DF-AE4C-91118238B220}"/>
+                <a16:creationId xmlns:a16="http://schemas.microsoft.com/office/drawing/2014/main" id="{1F4C4C04-B341-40DF-AE4C-91118238B220}"/>
               </a:ext>
             </a:extLst>
           </p:cNvPr>
@@ -308,7 +308,7 @@
           <p:cNvPr id="6" name="Slide Number Placeholder 5">
             <a:extLst>
               <a:ext uri="{FF2B5EF4-FFF2-40B4-BE49-F238E27FC236}">
-                <a16:creationId xmlns:a16="http://schemas.microsoft.com/office/drawing/2014/main" xmlns="" id="{5D5DEEB4-09EE-4C2E-8662-9C092E6C6068}"/>
+                <a16:creationId xmlns:a16="http://schemas.microsoft.com/office/drawing/2014/main" id="{5D5DEEB4-09EE-4C2E-8662-9C092E6C6068}"/>
               </a:ext>
             </a:extLst>
           </p:cNvPr>
@@ -367,7 +367,7 @@
           <p:cNvPr id="2" name="Title 1">
             <a:extLst>
               <a:ext uri="{FF2B5EF4-FFF2-40B4-BE49-F238E27FC236}">
-                <a16:creationId xmlns:a16="http://schemas.microsoft.com/office/drawing/2014/main" xmlns="" id="{3EAC4865-75A1-4DAD-BBC6-C5178758A32D}"/>
+                <a16:creationId xmlns:a16="http://schemas.microsoft.com/office/drawing/2014/main" id="{3EAC4865-75A1-4DAD-BBC6-C5178758A32D}"/>
               </a:ext>
             </a:extLst>
           </p:cNvPr>
@@ -396,7 +396,7 @@
           <p:cNvPr id="3" name="Vertical Text Placeholder 2">
             <a:extLst>
               <a:ext uri="{FF2B5EF4-FFF2-40B4-BE49-F238E27FC236}">
-                <a16:creationId xmlns:a16="http://schemas.microsoft.com/office/drawing/2014/main" xmlns="" id="{AC4CD941-D223-4224-9DCB-6F1BB2F51D9A}"/>
+                <a16:creationId xmlns:a16="http://schemas.microsoft.com/office/drawing/2014/main" id="{AC4CD941-D223-4224-9DCB-6F1BB2F51D9A}"/>
               </a:ext>
             </a:extLst>
           </p:cNvPr>
@@ -454,7 +454,7 @@
           <p:cNvPr id="4" name="Date Placeholder 3">
             <a:extLst>
               <a:ext uri="{FF2B5EF4-FFF2-40B4-BE49-F238E27FC236}">
-                <a16:creationId xmlns:a16="http://schemas.microsoft.com/office/drawing/2014/main" xmlns="" id="{CE0D82D8-31BE-476D-9492-36F4123C64A8}"/>
+                <a16:creationId xmlns:a16="http://schemas.microsoft.com/office/drawing/2014/main" id="{CE0D82D8-31BE-476D-9492-36F4123C64A8}"/>
               </a:ext>
             </a:extLst>
           </p:cNvPr>
@@ -472,7 +472,7 @@
           <a:p>
             <a:fld id="{CD63B9D5-DAC7-4B08-8CEE-404A79EB8B50}" type="datetimeFigureOut">
               <a:rPr lang="en-GB" smtClean="0"/>
-              <a:t>08/04/2020</a:t>
+              <a:t>04/11/2021</a:t>
             </a:fld>
             <a:endParaRPr lang="en-GB"/>
           </a:p>
@@ -483,7 +483,7 @@
           <p:cNvPr id="5" name="Footer Placeholder 4">
             <a:extLst>
               <a:ext uri="{FF2B5EF4-FFF2-40B4-BE49-F238E27FC236}">
-                <a16:creationId xmlns:a16="http://schemas.microsoft.com/office/drawing/2014/main" xmlns="" id="{85CCEE5C-93CB-4005-8B5B-96173BA1CE1F}"/>
+                <a16:creationId xmlns:a16="http://schemas.microsoft.com/office/drawing/2014/main" id="{85CCEE5C-93CB-4005-8B5B-96173BA1CE1F}"/>
               </a:ext>
             </a:extLst>
           </p:cNvPr>
@@ -508,7 +508,7 @@
           <p:cNvPr id="6" name="Slide Number Placeholder 5">
             <a:extLst>
               <a:ext uri="{FF2B5EF4-FFF2-40B4-BE49-F238E27FC236}">
-                <a16:creationId xmlns:a16="http://schemas.microsoft.com/office/drawing/2014/main" xmlns="" id="{77D533C4-744B-4ED9-A9A3-BE3780833F70}"/>
+                <a16:creationId xmlns:a16="http://schemas.microsoft.com/office/drawing/2014/main" id="{77D533C4-744B-4ED9-A9A3-BE3780833F70}"/>
               </a:ext>
             </a:extLst>
           </p:cNvPr>
@@ -567,7 +567,7 @@
           <p:cNvPr id="2" name="Vertical Title 1">
             <a:extLst>
               <a:ext uri="{FF2B5EF4-FFF2-40B4-BE49-F238E27FC236}">
-                <a16:creationId xmlns:a16="http://schemas.microsoft.com/office/drawing/2014/main" xmlns="" id="{688681E7-F837-4F64-9BB8-42F1D5E46D8A}"/>
+                <a16:creationId xmlns:a16="http://schemas.microsoft.com/office/drawing/2014/main" id="{688681E7-F837-4F64-9BB8-42F1D5E46D8A}"/>
               </a:ext>
             </a:extLst>
           </p:cNvPr>
@@ -601,7 +601,7 @@
           <p:cNvPr id="3" name="Vertical Text Placeholder 2">
             <a:extLst>
               <a:ext uri="{FF2B5EF4-FFF2-40B4-BE49-F238E27FC236}">
-                <a16:creationId xmlns:a16="http://schemas.microsoft.com/office/drawing/2014/main" xmlns="" id="{57EE781F-E227-4CC0-BCB8-6A13ED3D64A8}"/>
+                <a16:creationId xmlns:a16="http://schemas.microsoft.com/office/drawing/2014/main" id="{57EE781F-E227-4CC0-BCB8-6A13ED3D64A8}"/>
               </a:ext>
             </a:extLst>
           </p:cNvPr>
@@ -664,7 +664,7 @@
           <p:cNvPr id="4" name="Date Placeholder 3">
             <a:extLst>
               <a:ext uri="{FF2B5EF4-FFF2-40B4-BE49-F238E27FC236}">
-                <a16:creationId xmlns:a16="http://schemas.microsoft.com/office/drawing/2014/main" xmlns="" id="{5A00E8FF-4824-4DA7-A099-5673F81F4E5E}"/>
+                <a16:creationId xmlns:a16="http://schemas.microsoft.com/office/drawing/2014/main" id="{5A00E8FF-4824-4DA7-A099-5673F81F4E5E}"/>
               </a:ext>
             </a:extLst>
           </p:cNvPr>
@@ -682,7 +682,7 @@
           <a:p>
             <a:fld id="{CD63B9D5-DAC7-4B08-8CEE-404A79EB8B50}" type="datetimeFigureOut">
               <a:rPr lang="en-GB" smtClean="0"/>
-              <a:t>08/04/2020</a:t>
+              <a:t>04/11/2021</a:t>
             </a:fld>
             <a:endParaRPr lang="en-GB"/>
           </a:p>
@@ -693,7 +693,7 @@
           <p:cNvPr id="5" name="Footer Placeholder 4">
             <a:extLst>
               <a:ext uri="{FF2B5EF4-FFF2-40B4-BE49-F238E27FC236}">
-                <a16:creationId xmlns:a16="http://schemas.microsoft.com/office/drawing/2014/main" xmlns="" id="{4969B440-1EFC-412A-BFEA-7F256D0D3CAB}"/>
+                <a16:creationId xmlns:a16="http://schemas.microsoft.com/office/drawing/2014/main" id="{4969B440-1EFC-412A-BFEA-7F256D0D3CAB}"/>
               </a:ext>
             </a:extLst>
           </p:cNvPr>
@@ -718,7 +718,7 @@
           <p:cNvPr id="6" name="Slide Number Placeholder 5">
             <a:extLst>
               <a:ext uri="{FF2B5EF4-FFF2-40B4-BE49-F238E27FC236}">
-                <a16:creationId xmlns:a16="http://schemas.microsoft.com/office/drawing/2014/main" xmlns="" id="{DDA80736-99D3-48F4-9625-32CBA9B7D074}"/>
+                <a16:creationId xmlns:a16="http://schemas.microsoft.com/office/drawing/2014/main" id="{DDA80736-99D3-48F4-9625-32CBA9B7D074}"/>
               </a:ext>
             </a:extLst>
           </p:cNvPr>
@@ -777,7 +777,7 @@
           <p:cNvPr id="2" name="Title 1">
             <a:extLst>
               <a:ext uri="{FF2B5EF4-FFF2-40B4-BE49-F238E27FC236}">
-                <a16:creationId xmlns:a16="http://schemas.microsoft.com/office/drawing/2014/main" xmlns="" id="{E0DEB4AB-2ACD-4D36-9E26-4C108DF6D6BD}"/>
+                <a16:creationId xmlns:a16="http://schemas.microsoft.com/office/drawing/2014/main" id="{E0DEB4AB-2ACD-4D36-9E26-4C108DF6D6BD}"/>
               </a:ext>
             </a:extLst>
           </p:cNvPr>
@@ -806,7 +806,7 @@
           <p:cNvPr id="3" name="Content Placeholder 2">
             <a:extLst>
               <a:ext uri="{FF2B5EF4-FFF2-40B4-BE49-F238E27FC236}">
-                <a16:creationId xmlns:a16="http://schemas.microsoft.com/office/drawing/2014/main" xmlns="" id="{5DF2F204-B616-4B3F-88DE-B9607FF9DAF5}"/>
+                <a16:creationId xmlns:a16="http://schemas.microsoft.com/office/drawing/2014/main" id="{5DF2F204-B616-4B3F-88DE-B9607FF9DAF5}"/>
               </a:ext>
             </a:extLst>
           </p:cNvPr>
@@ -864,7 +864,7 @@
           <p:cNvPr id="4" name="Date Placeholder 3">
             <a:extLst>
               <a:ext uri="{FF2B5EF4-FFF2-40B4-BE49-F238E27FC236}">
-                <a16:creationId xmlns:a16="http://schemas.microsoft.com/office/drawing/2014/main" xmlns="" id="{3099031F-406C-461B-AC2A-D6B0BEE1F59E}"/>
+                <a16:creationId xmlns:a16="http://schemas.microsoft.com/office/drawing/2014/main" id="{3099031F-406C-461B-AC2A-D6B0BEE1F59E}"/>
               </a:ext>
             </a:extLst>
           </p:cNvPr>
@@ -882,7 +882,7 @@
           <a:p>
             <a:fld id="{CD63B9D5-DAC7-4B08-8CEE-404A79EB8B50}" type="datetimeFigureOut">
               <a:rPr lang="en-GB" smtClean="0"/>
-              <a:t>08/04/2020</a:t>
+              <a:t>04/11/2021</a:t>
             </a:fld>
             <a:endParaRPr lang="en-GB"/>
           </a:p>
@@ -893,7 +893,7 @@
           <p:cNvPr id="5" name="Footer Placeholder 4">
             <a:extLst>
               <a:ext uri="{FF2B5EF4-FFF2-40B4-BE49-F238E27FC236}">
-                <a16:creationId xmlns:a16="http://schemas.microsoft.com/office/drawing/2014/main" xmlns="" id="{D9A7AA01-5469-4B86-BD49-D9EABDB8823F}"/>
+                <a16:creationId xmlns:a16="http://schemas.microsoft.com/office/drawing/2014/main" id="{D9A7AA01-5469-4B86-BD49-D9EABDB8823F}"/>
               </a:ext>
             </a:extLst>
           </p:cNvPr>
@@ -918,7 +918,7 @@
           <p:cNvPr id="6" name="Slide Number Placeholder 5">
             <a:extLst>
               <a:ext uri="{FF2B5EF4-FFF2-40B4-BE49-F238E27FC236}">
-                <a16:creationId xmlns:a16="http://schemas.microsoft.com/office/drawing/2014/main" xmlns="" id="{668BD442-3189-4AE3-A972-49F6085D44CB}"/>
+                <a16:creationId xmlns:a16="http://schemas.microsoft.com/office/drawing/2014/main" id="{668BD442-3189-4AE3-A972-49F6085D44CB}"/>
               </a:ext>
             </a:extLst>
           </p:cNvPr>
@@ -977,7 +977,7 @@
           <p:cNvPr id="2" name="Title 1">
             <a:extLst>
               <a:ext uri="{FF2B5EF4-FFF2-40B4-BE49-F238E27FC236}">
-                <a16:creationId xmlns:a16="http://schemas.microsoft.com/office/drawing/2014/main" xmlns="" id="{9A02A5BD-1949-4548-93F1-CDE529AD1EF2}"/>
+                <a16:creationId xmlns:a16="http://schemas.microsoft.com/office/drawing/2014/main" id="{9A02A5BD-1949-4548-93F1-CDE529AD1EF2}"/>
               </a:ext>
             </a:extLst>
           </p:cNvPr>
@@ -1015,7 +1015,7 @@
           <p:cNvPr id="3" name="Text Placeholder 2">
             <a:extLst>
               <a:ext uri="{FF2B5EF4-FFF2-40B4-BE49-F238E27FC236}">
-                <a16:creationId xmlns:a16="http://schemas.microsoft.com/office/drawing/2014/main" xmlns="" id="{A888555D-FFFA-453D-ACAB-6206186F612C}"/>
+                <a16:creationId xmlns:a16="http://schemas.microsoft.com/office/drawing/2014/main" id="{A888555D-FFFA-453D-ACAB-6206186F612C}"/>
               </a:ext>
             </a:extLst>
           </p:cNvPr>
@@ -1140,7 +1140,7 @@
           <p:cNvPr id="4" name="Date Placeholder 3">
             <a:extLst>
               <a:ext uri="{FF2B5EF4-FFF2-40B4-BE49-F238E27FC236}">
-                <a16:creationId xmlns:a16="http://schemas.microsoft.com/office/drawing/2014/main" xmlns="" id="{6EAD1FF9-B926-433C-B06C-FB64E5C8160D}"/>
+                <a16:creationId xmlns:a16="http://schemas.microsoft.com/office/drawing/2014/main" id="{6EAD1FF9-B926-433C-B06C-FB64E5C8160D}"/>
               </a:ext>
             </a:extLst>
           </p:cNvPr>
@@ -1158,7 +1158,7 @@
           <a:p>
             <a:fld id="{CD63B9D5-DAC7-4B08-8CEE-404A79EB8B50}" type="datetimeFigureOut">
               <a:rPr lang="en-GB" smtClean="0"/>
-              <a:t>08/04/2020</a:t>
+              <a:t>04/11/2021</a:t>
             </a:fld>
             <a:endParaRPr lang="en-GB"/>
           </a:p>
@@ -1169,7 +1169,7 @@
           <p:cNvPr id="5" name="Footer Placeholder 4">
             <a:extLst>
               <a:ext uri="{FF2B5EF4-FFF2-40B4-BE49-F238E27FC236}">
-                <a16:creationId xmlns:a16="http://schemas.microsoft.com/office/drawing/2014/main" xmlns="" id="{1D40BA7E-57FB-4588-9A34-B9422F264B0B}"/>
+                <a16:creationId xmlns:a16="http://schemas.microsoft.com/office/drawing/2014/main" id="{1D40BA7E-57FB-4588-9A34-B9422F264B0B}"/>
               </a:ext>
             </a:extLst>
           </p:cNvPr>
@@ -1194,7 +1194,7 @@
           <p:cNvPr id="6" name="Slide Number Placeholder 5">
             <a:extLst>
               <a:ext uri="{FF2B5EF4-FFF2-40B4-BE49-F238E27FC236}">
-                <a16:creationId xmlns:a16="http://schemas.microsoft.com/office/drawing/2014/main" xmlns="" id="{3A1FFDA7-5351-4270-BE41-9CD2F959E409}"/>
+                <a16:creationId xmlns:a16="http://schemas.microsoft.com/office/drawing/2014/main" id="{3A1FFDA7-5351-4270-BE41-9CD2F959E409}"/>
               </a:ext>
             </a:extLst>
           </p:cNvPr>
@@ -1253,7 +1253,7 @@
           <p:cNvPr id="2" name="Title 1">
             <a:extLst>
               <a:ext uri="{FF2B5EF4-FFF2-40B4-BE49-F238E27FC236}">
-                <a16:creationId xmlns:a16="http://schemas.microsoft.com/office/drawing/2014/main" xmlns="" id="{D10AA3F8-7AD2-4A6C-AE51-D79A229E9B86}"/>
+                <a16:creationId xmlns:a16="http://schemas.microsoft.com/office/drawing/2014/main" id="{D10AA3F8-7AD2-4A6C-AE51-D79A229E9B86}"/>
               </a:ext>
             </a:extLst>
           </p:cNvPr>
@@ -1282,7 +1282,7 @@
           <p:cNvPr id="3" name="Content Placeholder 2">
             <a:extLst>
               <a:ext uri="{FF2B5EF4-FFF2-40B4-BE49-F238E27FC236}">
-                <a16:creationId xmlns:a16="http://schemas.microsoft.com/office/drawing/2014/main" xmlns="" id="{49E792F2-2085-4737-8A00-EB52F14FA311}"/>
+                <a16:creationId xmlns:a16="http://schemas.microsoft.com/office/drawing/2014/main" id="{49E792F2-2085-4737-8A00-EB52F14FA311}"/>
               </a:ext>
             </a:extLst>
           </p:cNvPr>
@@ -1345,7 +1345,7 @@
           <p:cNvPr id="4" name="Content Placeholder 3">
             <a:extLst>
               <a:ext uri="{FF2B5EF4-FFF2-40B4-BE49-F238E27FC236}">
-                <a16:creationId xmlns:a16="http://schemas.microsoft.com/office/drawing/2014/main" xmlns="" id="{FF48E3CE-BA15-45FF-BEF4-FB52DBF1006E}"/>
+                <a16:creationId xmlns:a16="http://schemas.microsoft.com/office/drawing/2014/main" id="{FF48E3CE-BA15-45FF-BEF4-FB52DBF1006E}"/>
               </a:ext>
             </a:extLst>
           </p:cNvPr>
@@ -1408,7 +1408,7 @@
           <p:cNvPr id="5" name="Date Placeholder 4">
             <a:extLst>
               <a:ext uri="{FF2B5EF4-FFF2-40B4-BE49-F238E27FC236}">
-                <a16:creationId xmlns:a16="http://schemas.microsoft.com/office/drawing/2014/main" xmlns="" id="{D7FF647A-3903-44BA-8128-944BAAF7455F}"/>
+                <a16:creationId xmlns:a16="http://schemas.microsoft.com/office/drawing/2014/main" id="{D7FF647A-3903-44BA-8128-944BAAF7455F}"/>
               </a:ext>
             </a:extLst>
           </p:cNvPr>
@@ -1426,7 +1426,7 @@
           <a:p>
             <a:fld id="{CD63B9D5-DAC7-4B08-8CEE-404A79EB8B50}" type="datetimeFigureOut">
               <a:rPr lang="en-GB" smtClean="0"/>
-              <a:t>08/04/2020</a:t>
+              <a:t>04/11/2021</a:t>
             </a:fld>
             <a:endParaRPr lang="en-GB"/>
           </a:p>
@@ -1437,7 +1437,7 @@
           <p:cNvPr id="6" name="Footer Placeholder 5">
             <a:extLst>
               <a:ext uri="{FF2B5EF4-FFF2-40B4-BE49-F238E27FC236}">
-                <a16:creationId xmlns:a16="http://schemas.microsoft.com/office/drawing/2014/main" xmlns="" id="{37E1F688-F587-4E7A-9629-3C5023528E89}"/>
+                <a16:creationId xmlns:a16="http://schemas.microsoft.com/office/drawing/2014/main" id="{37E1F688-F587-4E7A-9629-3C5023528E89}"/>
               </a:ext>
             </a:extLst>
           </p:cNvPr>
@@ -1462,7 +1462,7 @@
           <p:cNvPr id="7" name="Slide Number Placeholder 6">
             <a:extLst>
               <a:ext uri="{FF2B5EF4-FFF2-40B4-BE49-F238E27FC236}">
-                <a16:creationId xmlns:a16="http://schemas.microsoft.com/office/drawing/2014/main" xmlns="" id="{89513A7E-58AF-46B2-A4DA-E9FCB3FC295F}"/>
+                <a16:creationId xmlns:a16="http://schemas.microsoft.com/office/drawing/2014/main" id="{89513A7E-58AF-46B2-A4DA-E9FCB3FC295F}"/>
               </a:ext>
             </a:extLst>
           </p:cNvPr>
@@ -1521,7 +1521,7 @@
           <p:cNvPr id="2" name="Title 1">
             <a:extLst>
               <a:ext uri="{FF2B5EF4-FFF2-40B4-BE49-F238E27FC236}">
-                <a16:creationId xmlns:a16="http://schemas.microsoft.com/office/drawing/2014/main" xmlns="" id="{F885DEE0-906F-43A1-B94D-83EE2069D3A1}"/>
+                <a16:creationId xmlns:a16="http://schemas.microsoft.com/office/drawing/2014/main" id="{F885DEE0-906F-43A1-B94D-83EE2069D3A1}"/>
               </a:ext>
             </a:extLst>
           </p:cNvPr>
@@ -1555,7 +1555,7 @@
           <p:cNvPr id="3" name="Text Placeholder 2">
             <a:extLst>
               <a:ext uri="{FF2B5EF4-FFF2-40B4-BE49-F238E27FC236}">
-                <a16:creationId xmlns:a16="http://schemas.microsoft.com/office/drawing/2014/main" xmlns="" id="{0EDFBB4F-F248-4DFC-A6CE-7B9A43C69F07}"/>
+                <a16:creationId xmlns:a16="http://schemas.microsoft.com/office/drawing/2014/main" id="{0EDFBB4F-F248-4DFC-A6CE-7B9A43C69F07}"/>
               </a:ext>
             </a:extLst>
           </p:cNvPr>
@@ -1626,7 +1626,7 @@
           <p:cNvPr id="4" name="Content Placeholder 3">
             <a:extLst>
               <a:ext uri="{FF2B5EF4-FFF2-40B4-BE49-F238E27FC236}">
-                <a16:creationId xmlns:a16="http://schemas.microsoft.com/office/drawing/2014/main" xmlns="" id="{913AAB10-03B8-495A-93E6-6C140E343699}"/>
+                <a16:creationId xmlns:a16="http://schemas.microsoft.com/office/drawing/2014/main" id="{913AAB10-03B8-495A-93E6-6C140E343699}"/>
               </a:ext>
             </a:extLst>
           </p:cNvPr>
@@ -1689,7 +1689,7 @@
           <p:cNvPr id="5" name="Text Placeholder 4">
             <a:extLst>
               <a:ext uri="{FF2B5EF4-FFF2-40B4-BE49-F238E27FC236}">
-                <a16:creationId xmlns:a16="http://schemas.microsoft.com/office/drawing/2014/main" xmlns="" id="{D796D015-D28A-4436-806E-BE0885729726}"/>
+                <a16:creationId xmlns:a16="http://schemas.microsoft.com/office/drawing/2014/main" id="{D796D015-D28A-4436-806E-BE0885729726}"/>
               </a:ext>
             </a:extLst>
           </p:cNvPr>
@@ -1760,7 +1760,7 @@
           <p:cNvPr id="6" name="Content Placeholder 5">
             <a:extLst>
               <a:ext uri="{FF2B5EF4-FFF2-40B4-BE49-F238E27FC236}">
-                <a16:creationId xmlns:a16="http://schemas.microsoft.com/office/drawing/2014/main" xmlns="" id="{6941E6C3-7B55-4DC6-B3BE-5267F66AAFCD}"/>
+                <a16:creationId xmlns:a16="http://schemas.microsoft.com/office/drawing/2014/main" id="{6941E6C3-7B55-4DC6-B3BE-5267F66AAFCD}"/>
               </a:ext>
             </a:extLst>
           </p:cNvPr>
@@ -1823,7 +1823,7 @@
           <p:cNvPr id="7" name="Date Placeholder 6">
             <a:extLst>
               <a:ext uri="{FF2B5EF4-FFF2-40B4-BE49-F238E27FC236}">
-                <a16:creationId xmlns:a16="http://schemas.microsoft.com/office/drawing/2014/main" xmlns="" id="{B24863BF-F146-4BF9-82BE-D5C98465F44A}"/>
+                <a16:creationId xmlns:a16="http://schemas.microsoft.com/office/drawing/2014/main" id="{B24863BF-F146-4BF9-82BE-D5C98465F44A}"/>
               </a:ext>
             </a:extLst>
           </p:cNvPr>
@@ -1841,7 +1841,7 @@
           <a:p>
             <a:fld id="{CD63B9D5-DAC7-4B08-8CEE-404A79EB8B50}" type="datetimeFigureOut">
               <a:rPr lang="en-GB" smtClean="0"/>
-              <a:t>08/04/2020</a:t>
+              <a:t>04/11/2021</a:t>
             </a:fld>
             <a:endParaRPr lang="en-GB"/>
           </a:p>
@@ -1852,7 +1852,7 @@
           <p:cNvPr id="8" name="Footer Placeholder 7">
             <a:extLst>
               <a:ext uri="{FF2B5EF4-FFF2-40B4-BE49-F238E27FC236}">
-                <a16:creationId xmlns:a16="http://schemas.microsoft.com/office/drawing/2014/main" xmlns="" id="{DC2043F8-A70E-45E2-B246-AF3F81BA80EE}"/>
+                <a16:creationId xmlns:a16="http://schemas.microsoft.com/office/drawing/2014/main" id="{DC2043F8-A70E-45E2-B246-AF3F81BA80EE}"/>
               </a:ext>
             </a:extLst>
           </p:cNvPr>
@@ -1877,7 +1877,7 @@
           <p:cNvPr id="9" name="Slide Number Placeholder 8">
             <a:extLst>
               <a:ext uri="{FF2B5EF4-FFF2-40B4-BE49-F238E27FC236}">
-                <a16:creationId xmlns:a16="http://schemas.microsoft.com/office/drawing/2014/main" xmlns="" id="{808CE3B0-7C7B-4AEC-ABDD-C5C25CB2D59F}"/>
+                <a16:creationId xmlns:a16="http://schemas.microsoft.com/office/drawing/2014/main" id="{808CE3B0-7C7B-4AEC-ABDD-C5C25CB2D59F}"/>
               </a:ext>
             </a:extLst>
           </p:cNvPr>
@@ -1936,7 +1936,7 @@
           <p:cNvPr id="2" name="Title 1">
             <a:extLst>
               <a:ext uri="{FF2B5EF4-FFF2-40B4-BE49-F238E27FC236}">
-                <a16:creationId xmlns:a16="http://schemas.microsoft.com/office/drawing/2014/main" xmlns="" id="{7CA1A695-9C4D-4596-92E8-E75C6B27B406}"/>
+                <a16:creationId xmlns:a16="http://schemas.microsoft.com/office/drawing/2014/main" id="{7CA1A695-9C4D-4596-92E8-E75C6B27B406}"/>
               </a:ext>
             </a:extLst>
           </p:cNvPr>
@@ -1965,7 +1965,7 @@
           <p:cNvPr id="3" name="Date Placeholder 2">
             <a:extLst>
               <a:ext uri="{FF2B5EF4-FFF2-40B4-BE49-F238E27FC236}">
-                <a16:creationId xmlns:a16="http://schemas.microsoft.com/office/drawing/2014/main" xmlns="" id="{22CC87F7-07CB-4214-8296-DD5FF904E220}"/>
+                <a16:creationId xmlns:a16="http://schemas.microsoft.com/office/drawing/2014/main" id="{22CC87F7-07CB-4214-8296-DD5FF904E220}"/>
               </a:ext>
             </a:extLst>
           </p:cNvPr>
@@ -1983,7 +1983,7 @@
           <a:p>
             <a:fld id="{CD63B9D5-DAC7-4B08-8CEE-404A79EB8B50}" type="datetimeFigureOut">
               <a:rPr lang="en-GB" smtClean="0"/>
-              <a:t>08/04/2020</a:t>
+              <a:t>04/11/2021</a:t>
             </a:fld>
             <a:endParaRPr lang="en-GB"/>
           </a:p>
@@ -1994,7 +1994,7 @@
           <p:cNvPr id="4" name="Footer Placeholder 3">
             <a:extLst>
               <a:ext uri="{FF2B5EF4-FFF2-40B4-BE49-F238E27FC236}">
-                <a16:creationId xmlns:a16="http://schemas.microsoft.com/office/drawing/2014/main" xmlns="" id="{3C9715A1-6DA6-4A41-84F7-B50E9BA0E3E0}"/>
+                <a16:creationId xmlns:a16="http://schemas.microsoft.com/office/drawing/2014/main" id="{3C9715A1-6DA6-4A41-84F7-B50E9BA0E3E0}"/>
               </a:ext>
             </a:extLst>
           </p:cNvPr>
@@ -2019,7 +2019,7 @@
           <p:cNvPr id="5" name="Slide Number Placeholder 4">
             <a:extLst>
               <a:ext uri="{FF2B5EF4-FFF2-40B4-BE49-F238E27FC236}">
-                <a16:creationId xmlns:a16="http://schemas.microsoft.com/office/drawing/2014/main" xmlns="" id="{C9D5EFE8-7FD1-4DF4-86A8-2A232A281290}"/>
+                <a16:creationId xmlns:a16="http://schemas.microsoft.com/office/drawing/2014/main" id="{C9D5EFE8-7FD1-4DF4-86A8-2A232A281290}"/>
               </a:ext>
             </a:extLst>
           </p:cNvPr>
@@ -2078,7 +2078,7 @@
           <p:cNvPr id="2" name="Date Placeholder 1">
             <a:extLst>
               <a:ext uri="{FF2B5EF4-FFF2-40B4-BE49-F238E27FC236}">
-                <a16:creationId xmlns:a16="http://schemas.microsoft.com/office/drawing/2014/main" xmlns="" id="{48B95A67-71FC-4D0D-96F5-031CEF8EF530}"/>
+                <a16:creationId xmlns:a16="http://schemas.microsoft.com/office/drawing/2014/main" id="{48B95A67-71FC-4D0D-96F5-031CEF8EF530}"/>
               </a:ext>
             </a:extLst>
           </p:cNvPr>
@@ -2096,7 +2096,7 @@
           <a:p>
             <a:fld id="{CD63B9D5-DAC7-4B08-8CEE-404A79EB8B50}" type="datetimeFigureOut">
               <a:rPr lang="en-GB" smtClean="0"/>
-              <a:t>08/04/2020</a:t>
+              <a:t>04/11/2021</a:t>
             </a:fld>
             <a:endParaRPr lang="en-GB"/>
           </a:p>
@@ -2107,7 +2107,7 @@
           <p:cNvPr id="3" name="Footer Placeholder 2">
             <a:extLst>
               <a:ext uri="{FF2B5EF4-FFF2-40B4-BE49-F238E27FC236}">
-                <a16:creationId xmlns:a16="http://schemas.microsoft.com/office/drawing/2014/main" xmlns="" id="{083B286F-4DFF-4AA2-A347-FD17748FFDFF}"/>
+                <a16:creationId xmlns:a16="http://schemas.microsoft.com/office/drawing/2014/main" id="{083B286F-4DFF-4AA2-A347-FD17748FFDFF}"/>
               </a:ext>
             </a:extLst>
           </p:cNvPr>
@@ -2132,7 +2132,7 @@
           <p:cNvPr id="4" name="Slide Number Placeholder 3">
             <a:extLst>
               <a:ext uri="{FF2B5EF4-FFF2-40B4-BE49-F238E27FC236}">
-                <a16:creationId xmlns:a16="http://schemas.microsoft.com/office/drawing/2014/main" xmlns="" id="{2731AD27-8C09-4D3D-BB5B-6B9760DD39F3}"/>
+                <a16:creationId xmlns:a16="http://schemas.microsoft.com/office/drawing/2014/main" id="{2731AD27-8C09-4D3D-BB5B-6B9760DD39F3}"/>
               </a:ext>
             </a:extLst>
           </p:cNvPr>
@@ -2191,7 +2191,7 @@
           <p:cNvPr id="2" name="Title 1">
             <a:extLst>
               <a:ext uri="{FF2B5EF4-FFF2-40B4-BE49-F238E27FC236}">
-                <a16:creationId xmlns:a16="http://schemas.microsoft.com/office/drawing/2014/main" xmlns="" id="{7B7E36D2-947E-47E4-A62D-FAD241D98AD8}"/>
+                <a16:creationId xmlns:a16="http://schemas.microsoft.com/office/drawing/2014/main" id="{7B7E36D2-947E-47E4-A62D-FAD241D98AD8}"/>
               </a:ext>
             </a:extLst>
           </p:cNvPr>
@@ -2229,7 +2229,7 @@
           <p:cNvPr id="3" name="Content Placeholder 2">
             <a:extLst>
               <a:ext uri="{FF2B5EF4-FFF2-40B4-BE49-F238E27FC236}">
-                <a16:creationId xmlns:a16="http://schemas.microsoft.com/office/drawing/2014/main" xmlns="" id="{914C2D84-9D6A-4AF9-BEA3-36066D34BB3B}"/>
+                <a16:creationId xmlns:a16="http://schemas.microsoft.com/office/drawing/2014/main" id="{914C2D84-9D6A-4AF9-BEA3-36066D34BB3B}"/>
               </a:ext>
             </a:extLst>
           </p:cNvPr>
@@ -2320,7 +2320,7 @@
           <p:cNvPr id="4" name="Text Placeholder 3">
             <a:extLst>
               <a:ext uri="{FF2B5EF4-FFF2-40B4-BE49-F238E27FC236}">
-                <a16:creationId xmlns:a16="http://schemas.microsoft.com/office/drawing/2014/main" xmlns="" id="{6243A93F-9C78-4180-BC63-C9AA8406A91D}"/>
+                <a16:creationId xmlns:a16="http://schemas.microsoft.com/office/drawing/2014/main" id="{6243A93F-9C78-4180-BC63-C9AA8406A91D}"/>
               </a:ext>
             </a:extLst>
           </p:cNvPr>
@@ -2391,7 +2391,7 @@
           <p:cNvPr id="5" name="Date Placeholder 4">
             <a:extLst>
               <a:ext uri="{FF2B5EF4-FFF2-40B4-BE49-F238E27FC236}">
-                <a16:creationId xmlns:a16="http://schemas.microsoft.com/office/drawing/2014/main" xmlns="" id="{150242FA-EA05-4ECF-A431-C99805AE8DF2}"/>
+                <a16:creationId xmlns:a16="http://schemas.microsoft.com/office/drawing/2014/main" id="{150242FA-EA05-4ECF-A431-C99805AE8DF2}"/>
               </a:ext>
             </a:extLst>
           </p:cNvPr>
@@ -2409,7 +2409,7 @@
           <a:p>
             <a:fld id="{CD63B9D5-DAC7-4B08-8CEE-404A79EB8B50}" type="datetimeFigureOut">
               <a:rPr lang="en-GB" smtClean="0"/>
-              <a:t>08/04/2020</a:t>
+              <a:t>04/11/2021</a:t>
             </a:fld>
             <a:endParaRPr lang="en-GB"/>
           </a:p>
@@ -2420,7 +2420,7 @@
           <p:cNvPr id="6" name="Footer Placeholder 5">
             <a:extLst>
               <a:ext uri="{FF2B5EF4-FFF2-40B4-BE49-F238E27FC236}">
-                <a16:creationId xmlns:a16="http://schemas.microsoft.com/office/drawing/2014/main" xmlns="" id="{0038E84D-C6EA-4230-B34D-985C0C575DA6}"/>
+                <a16:creationId xmlns:a16="http://schemas.microsoft.com/office/drawing/2014/main" id="{0038E84D-C6EA-4230-B34D-985C0C575DA6}"/>
               </a:ext>
             </a:extLst>
           </p:cNvPr>
@@ -2445,7 +2445,7 @@
           <p:cNvPr id="7" name="Slide Number Placeholder 6">
             <a:extLst>
               <a:ext uri="{FF2B5EF4-FFF2-40B4-BE49-F238E27FC236}">
-                <a16:creationId xmlns:a16="http://schemas.microsoft.com/office/drawing/2014/main" xmlns="" id="{4B22D5FF-B1DD-4B28-866C-56DD45FBE717}"/>
+                <a16:creationId xmlns:a16="http://schemas.microsoft.com/office/drawing/2014/main" id="{4B22D5FF-B1DD-4B28-866C-56DD45FBE717}"/>
               </a:ext>
             </a:extLst>
           </p:cNvPr>
@@ -2504,7 +2504,7 @@
           <p:cNvPr id="2" name="Title 1">
             <a:extLst>
               <a:ext uri="{FF2B5EF4-FFF2-40B4-BE49-F238E27FC236}">
-                <a16:creationId xmlns:a16="http://schemas.microsoft.com/office/drawing/2014/main" xmlns="" id="{634BEE94-FEDF-40D9-9699-99410C9465D8}"/>
+                <a16:creationId xmlns:a16="http://schemas.microsoft.com/office/drawing/2014/main" id="{634BEE94-FEDF-40D9-9699-99410C9465D8}"/>
               </a:ext>
             </a:extLst>
           </p:cNvPr>
@@ -2542,7 +2542,7 @@
           <p:cNvPr id="3" name="Picture Placeholder 2">
             <a:extLst>
               <a:ext uri="{FF2B5EF4-FFF2-40B4-BE49-F238E27FC236}">
-                <a16:creationId xmlns:a16="http://schemas.microsoft.com/office/drawing/2014/main" xmlns="" id="{76248A86-4CC2-453D-B05F-1C2B24E9A6D8}"/>
+                <a16:creationId xmlns:a16="http://schemas.microsoft.com/office/drawing/2014/main" id="{76248A86-4CC2-453D-B05F-1C2B24E9A6D8}"/>
               </a:ext>
             </a:extLst>
           </p:cNvPr>
@@ -2609,7 +2609,7 @@
           <p:cNvPr id="4" name="Text Placeholder 3">
             <a:extLst>
               <a:ext uri="{FF2B5EF4-FFF2-40B4-BE49-F238E27FC236}">
-                <a16:creationId xmlns:a16="http://schemas.microsoft.com/office/drawing/2014/main" xmlns="" id="{0A00B450-7D9C-4243-81C2-1188B1712CED}"/>
+                <a16:creationId xmlns:a16="http://schemas.microsoft.com/office/drawing/2014/main" id="{0A00B450-7D9C-4243-81C2-1188B1712CED}"/>
               </a:ext>
             </a:extLst>
           </p:cNvPr>
@@ -2680,7 +2680,7 @@
           <p:cNvPr id="5" name="Date Placeholder 4">
             <a:extLst>
               <a:ext uri="{FF2B5EF4-FFF2-40B4-BE49-F238E27FC236}">
-                <a16:creationId xmlns:a16="http://schemas.microsoft.com/office/drawing/2014/main" xmlns="" id="{37296551-D478-465D-831C-96C8AF0CB33D}"/>
+                <a16:creationId xmlns:a16="http://schemas.microsoft.com/office/drawing/2014/main" id="{37296551-D478-465D-831C-96C8AF0CB33D}"/>
               </a:ext>
             </a:extLst>
           </p:cNvPr>
@@ -2698,7 +2698,7 @@
           <a:p>
             <a:fld id="{CD63B9D5-DAC7-4B08-8CEE-404A79EB8B50}" type="datetimeFigureOut">
               <a:rPr lang="en-GB" smtClean="0"/>
-              <a:t>08/04/2020</a:t>
+              <a:t>04/11/2021</a:t>
             </a:fld>
             <a:endParaRPr lang="en-GB"/>
           </a:p>
@@ -2709,7 +2709,7 @@
           <p:cNvPr id="6" name="Footer Placeholder 5">
             <a:extLst>
               <a:ext uri="{FF2B5EF4-FFF2-40B4-BE49-F238E27FC236}">
-                <a16:creationId xmlns:a16="http://schemas.microsoft.com/office/drawing/2014/main" xmlns="" id="{ABA4E524-0252-4AB0-90B5-B7CC3B2478C6}"/>
+                <a16:creationId xmlns:a16="http://schemas.microsoft.com/office/drawing/2014/main" id="{ABA4E524-0252-4AB0-90B5-B7CC3B2478C6}"/>
               </a:ext>
             </a:extLst>
           </p:cNvPr>
@@ -2734,7 +2734,7 @@
           <p:cNvPr id="7" name="Slide Number Placeholder 6">
             <a:extLst>
               <a:ext uri="{FF2B5EF4-FFF2-40B4-BE49-F238E27FC236}">
-                <a16:creationId xmlns:a16="http://schemas.microsoft.com/office/drawing/2014/main" xmlns="" id="{1AFF83BD-F807-4BA1-8BF1-CF413382D286}"/>
+                <a16:creationId xmlns:a16="http://schemas.microsoft.com/office/drawing/2014/main" id="{1AFF83BD-F807-4BA1-8BF1-CF413382D286}"/>
               </a:ext>
             </a:extLst>
           </p:cNvPr>
@@ -2798,7 +2798,7 @@
           <p:cNvPr id="2" name="Title Placeholder 1">
             <a:extLst>
               <a:ext uri="{FF2B5EF4-FFF2-40B4-BE49-F238E27FC236}">
-                <a16:creationId xmlns:a16="http://schemas.microsoft.com/office/drawing/2014/main" xmlns="" id="{B28F1C91-5049-47A4-A4D5-5A7BBE7720F6}"/>
+                <a16:creationId xmlns:a16="http://schemas.microsoft.com/office/drawing/2014/main" id="{B28F1C91-5049-47A4-A4D5-5A7BBE7720F6}"/>
               </a:ext>
             </a:extLst>
           </p:cNvPr>
@@ -2837,7 +2837,7 @@
           <p:cNvPr id="3" name="Text Placeholder 2">
             <a:extLst>
               <a:ext uri="{FF2B5EF4-FFF2-40B4-BE49-F238E27FC236}">
-                <a16:creationId xmlns:a16="http://schemas.microsoft.com/office/drawing/2014/main" xmlns="" id="{80E007B8-BBD7-438D-9DDC-5B6A646CEA5D}"/>
+                <a16:creationId xmlns:a16="http://schemas.microsoft.com/office/drawing/2014/main" id="{80E007B8-BBD7-438D-9DDC-5B6A646CEA5D}"/>
               </a:ext>
             </a:extLst>
           </p:cNvPr>
@@ -2905,7 +2905,7 @@
           <p:cNvPr id="4" name="Date Placeholder 3">
             <a:extLst>
               <a:ext uri="{FF2B5EF4-FFF2-40B4-BE49-F238E27FC236}">
-                <a16:creationId xmlns:a16="http://schemas.microsoft.com/office/drawing/2014/main" xmlns="" id="{285C4E8A-F193-4D8B-B1C5-DAA70667FC3A}"/>
+                <a16:creationId xmlns:a16="http://schemas.microsoft.com/office/drawing/2014/main" id="{285C4E8A-F193-4D8B-B1C5-DAA70667FC3A}"/>
               </a:ext>
             </a:extLst>
           </p:cNvPr>
@@ -2941,7 +2941,7 @@
           <a:p>
             <a:fld id="{CD63B9D5-DAC7-4B08-8CEE-404A79EB8B50}" type="datetimeFigureOut">
               <a:rPr lang="en-GB" smtClean="0"/>
-              <a:t>08/04/2020</a:t>
+              <a:t>04/11/2021</a:t>
             </a:fld>
             <a:endParaRPr lang="en-GB"/>
           </a:p>
@@ -2952,7 +2952,7 @@
           <p:cNvPr id="5" name="Footer Placeholder 4">
             <a:extLst>
               <a:ext uri="{FF2B5EF4-FFF2-40B4-BE49-F238E27FC236}">
-                <a16:creationId xmlns:a16="http://schemas.microsoft.com/office/drawing/2014/main" xmlns="" id="{3C6C922C-A814-44FA-85E1-132D039C1AD6}"/>
+                <a16:creationId xmlns:a16="http://schemas.microsoft.com/office/drawing/2014/main" id="{3C6C922C-A814-44FA-85E1-132D039C1AD6}"/>
               </a:ext>
             </a:extLst>
           </p:cNvPr>
@@ -2995,7 +2995,7 @@
           <p:cNvPr id="6" name="Slide Number Placeholder 5">
             <a:extLst>
               <a:ext uri="{FF2B5EF4-FFF2-40B4-BE49-F238E27FC236}">
-                <a16:creationId xmlns:a16="http://schemas.microsoft.com/office/drawing/2014/main" xmlns="" id="{D661AED9-B417-438B-B806-A1B24189790D}"/>
+                <a16:creationId xmlns:a16="http://schemas.microsoft.com/office/drawing/2014/main" id="{D661AED9-B417-438B-B806-A1B24189790D}"/>
               </a:ext>
             </a:extLst>
           </p:cNvPr>
@@ -3363,7 +3363,7 @@
           <p:cNvPr id="30" name="Rounded Rectangle 62">
             <a:extLst>
               <a:ext uri="{FF2B5EF4-FFF2-40B4-BE49-F238E27FC236}">
-                <a16:creationId xmlns:a16="http://schemas.microsoft.com/office/drawing/2014/main" xmlns="" id="{3F6E10D4-26BB-4DCC-8CBA-55A4F2B5F5D3}"/>
+                <a16:creationId xmlns:a16="http://schemas.microsoft.com/office/drawing/2014/main" id="{3F6E10D4-26BB-4DCC-8CBA-55A4F2B5F5D3}"/>
               </a:ext>
             </a:extLst>
           </p:cNvPr>
@@ -3436,7 +3436,7 @@
           <p:cNvPr id="29" name="Rounded Rectangle 62">
             <a:extLst>
               <a:ext uri="{FF2B5EF4-FFF2-40B4-BE49-F238E27FC236}">
-                <a16:creationId xmlns:a16="http://schemas.microsoft.com/office/drawing/2014/main" xmlns="" id="{49A2EAC0-FC35-4951-ABE9-F61076C2F8FB}"/>
+                <a16:creationId xmlns:a16="http://schemas.microsoft.com/office/drawing/2014/main" id="{49A2EAC0-FC35-4951-ABE9-F61076C2F8FB}"/>
               </a:ext>
             </a:extLst>
           </p:cNvPr>
@@ -3509,7 +3509,7 @@
           <p:cNvPr id="5" name="Rounded Rectangle 55">
             <a:extLst>
               <a:ext uri="{FF2B5EF4-FFF2-40B4-BE49-F238E27FC236}">
-                <a16:creationId xmlns:a16="http://schemas.microsoft.com/office/drawing/2014/main" xmlns="" id="{4A5EA21A-B517-4E62-A38B-3311846757EF}"/>
+                <a16:creationId xmlns:a16="http://schemas.microsoft.com/office/drawing/2014/main" id="{4A5EA21A-B517-4E62-A38B-3311846757EF}"/>
               </a:ext>
             </a:extLst>
           </p:cNvPr>
@@ -3580,7 +3580,7 @@
           <p:cNvPr id="6" name="Rounded Rectangle 55">
             <a:extLst>
               <a:ext uri="{FF2B5EF4-FFF2-40B4-BE49-F238E27FC236}">
-                <a16:creationId xmlns:a16="http://schemas.microsoft.com/office/drawing/2014/main" xmlns="" id="{E2480A1E-B4E5-40BB-8533-46532A737389}"/>
+                <a16:creationId xmlns:a16="http://schemas.microsoft.com/office/drawing/2014/main" id="{E2480A1E-B4E5-40BB-8533-46532A737389}"/>
               </a:ext>
             </a:extLst>
           </p:cNvPr>
@@ -3651,7 +3651,7 @@
           <p:cNvPr id="8" name="Rounded Rectangle 167">
             <a:extLst>
               <a:ext uri="{FF2B5EF4-FFF2-40B4-BE49-F238E27FC236}">
-                <a16:creationId xmlns:a16="http://schemas.microsoft.com/office/drawing/2014/main" xmlns="" id="{AA3214B3-646B-4C60-874B-CC098979DDCB}"/>
+                <a16:creationId xmlns:a16="http://schemas.microsoft.com/office/drawing/2014/main" id="{AA3214B3-646B-4C60-874B-CC098979DDCB}"/>
               </a:ext>
             </a:extLst>
           </p:cNvPr>
@@ -3726,7 +3726,7 @@
           <p:cNvPr id="12" name="Straight Connector 11">
             <a:extLst>
               <a:ext uri="{FF2B5EF4-FFF2-40B4-BE49-F238E27FC236}">
-                <a16:creationId xmlns:a16="http://schemas.microsoft.com/office/drawing/2014/main" xmlns="" id="{D8D5512F-026B-41C6-BF50-275A07B428A9}"/>
+                <a16:creationId xmlns:a16="http://schemas.microsoft.com/office/drawing/2014/main" id="{D8D5512F-026B-41C6-BF50-275A07B428A9}"/>
               </a:ext>
             </a:extLst>
           </p:cNvPr>
@@ -3763,7 +3763,7 @@
           <p:cNvPr id="15" name="Straight Connector 14">
             <a:extLst>
               <a:ext uri="{FF2B5EF4-FFF2-40B4-BE49-F238E27FC236}">
-                <a16:creationId xmlns:a16="http://schemas.microsoft.com/office/drawing/2014/main" xmlns="" id="{6282449E-F895-410F-8614-62C6739CF51F}"/>
+                <a16:creationId xmlns:a16="http://schemas.microsoft.com/office/drawing/2014/main" id="{6282449E-F895-410F-8614-62C6739CF51F}"/>
               </a:ext>
             </a:extLst>
           </p:cNvPr>
@@ -3800,7 +3800,7 @@
           <p:cNvPr id="18" name="Straight Connector 17">
             <a:extLst>
               <a:ext uri="{FF2B5EF4-FFF2-40B4-BE49-F238E27FC236}">
-                <a16:creationId xmlns:a16="http://schemas.microsoft.com/office/drawing/2014/main" xmlns="" id="{9CC9F9E8-CBE4-4A9F-8C43-9EFF102B692A}"/>
+                <a16:creationId xmlns:a16="http://schemas.microsoft.com/office/drawing/2014/main" id="{9CC9F9E8-CBE4-4A9F-8C43-9EFF102B692A}"/>
               </a:ext>
             </a:extLst>
           </p:cNvPr>
@@ -3837,7 +3837,7 @@
           <p:cNvPr id="21" name="Straight Connector 20">
             <a:extLst>
               <a:ext uri="{FF2B5EF4-FFF2-40B4-BE49-F238E27FC236}">
-                <a16:creationId xmlns:a16="http://schemas.microsoft.com/office/drawing/2014/main" xmlns="" id="{6813BE6C-254F-4092-AEC2-E661C58CF52F}"/>
+                <a16:creationId xmlns:a16="http://schemas.microsoft.com/office/drawing/2014/main" id="{6813BE6C-254F-4092-AEC2-E661C58CF52F}"/>
               </a:ext>
             </a:extLst>
           </p:cNvPr>
@@ -3875,7 +3875,7 @@
           <p:cNvPr id="25" name="Straight Connector 24">
             <a:extLst>
               <a:ext uri="{FF2B5EF4-FFF2-40B4-BE49-F238E27FC236}">
-                <a16:creationId xmlns:a16="http://schemas.microsoft.com/office/drawing/2014/main" xmlns="" id="{D4A6C4D9-A95C-48A7-9BD7-143A3A45576A}"/>
+                <a16:creationId xmlns:a16="http://schemas.microsoft.com/office/drawing/2014/main" id="{D4A6C4D9-A95C-48A7-9BD7-143A3A45576A}"/>
               </a:ext>
             </a:extLst>
           </p:cNvPr>
@@ -3913,7 +3913,7 @@
           <p:cNvPr id="66" name="TextBox 65">
             <a:extLst>
               <a:ext uri="{FF2B5EF4-FFF2-40B4-BE49-F238E27FC236}">
-                <a16:creationId xmlns:a16="http://schemas.microsoft.com/office/drawing/2014/main" xmlns="" id="{8E0DBEBC-B1F4-42A5-AC52-02D36426541B}"/>
+                <a16:creationId xmlns:a16="http://schemas.microsoft.com/office/drawing/2014/main" id="{8E0DBEBC-B1F4-42A5-AC52-02D36426541B}"/>
               </a:ext>
             </a:extLst>
           </p:cNvPr>
@@ -3978,7 +3978,7 @@
           <p:cNvPr id="124" name="TextBox 123">
             <a:extLst>
               <a:ext uri="{FF2B5EF4-FFF2-40B4-BE49-F238E27FC236}">
-                <a16:creationId xmlns:a16="http://schemas.microsoft.com/office/drawing/2014/main" xmlns="" id="{B7EDA9D7-C5F9-4836-B579-FBAAC861B1FD}"/>
+                <a16:creationId xmlns:a16="http://schemas.microsoft.com/office/drawing/2014/main" id="{B7EDA9D7-C5F9-4836-B579-FBAAC861B1FD}"/>
               </a:ext>
             </a:extLst>
           </p:cNvPr>
@@ -4033,22 +4033,25 @@
                 <a:ea typeface="Source Sans Pro Light" charset="0"/>
                 <a:cs typeface="Source Sans Pro Light" charset="0"/>
               </a:rPr>
-              <a:t>SimJPF</a:t>
-            </a:r>
-            <a:endParaRPr kumimoji="0" lang="en-US" sz="1200" b="1" i="0" u="none" strike="noStrike" kern="0" cap="none" spc="0" normalizeH="0" baseline="0" noProof="0" dirty="0">
-              <a:ln>
-                <a:noFill/>
-              </a:ln>
-              <a:solidFill>
-                <a:srgbClr val="4B5357"/>
-              </a:solidFill>
-              <a:effectLst/>
-              <a:uLnTx/>
-              <a:uFillTx/>
-              <a:latin typeface="Source Sans Pro Light" charset="0"/>
-              <a:ea typeface="Source Sans Pro Light" charset="0"/>
-              <a:cs typeface="Source Sans Pro Light" charset="0"/>
-            </a:endParaRPr>
+              <a:t>MicroEJ</a:t>
+            </a:r>
+            <a:r>
+              <a:rPr kumimoji="0" lang="en-US" sz="1200" b="1" i="0" u="none" strike="noStrike" kern="0" cap="none" spc="0" normalizeH="0" baseline="0" noProof="0" dirty="0">
+                <a:ln>
+                  <a:noFill/>
+                </a:ln>
+                <a:solidFill>
+                  <a:srgbClr val="4B5357"/>
+                </a:solidFill>
+                <a:effectLst/>
+                <a:uLnTx/>
+                <a:uFillTx/>
+                <a:latin typeface="Source Sans Pro Light" charset="0"/>
+                <a:ea typeface="Source Sans Pro Light" charset="0"/>
+                <a:cs typeface="Source Sans Pro Light" charset="0"/>
+              </a:rPr>
+              <a:t> Simulator</a:t>
+            </a:r>
           </a:p>
         </p:txBody>
       </p:sp>
@@ -4057,7 +4060,7 @@
           <p:cNvPr id="77" name="TextBox 76">
             <a:extLst>
               <a:ext uri="{FF2B5EF4-FFF2-40B4-BE49-F238E27FC236}">
-                <a16:creationId xmlns:a16="http://schemas.microsoft.com/office/drawing/2014/main" xmlns="" id="{5EB25632-8919-4305-BB0D-98CA57CE0AA9}"/>
+                <a16:creationId xmlns:a16="http://schemas.microsoft.com/office/drawing/2014/main" id="{5EB25632-8919-4305-BB0D-98CA57CE0AA9}"/>
               </a:ext>
             </a:extLst>
           </p:cNvPr>
@@ -4122,7 +4125,7 @@
           <p:cNvPr id="79" name="TextBox 78">
             <a:extLst>
               <a:ext uri="{FF2B5EF4-FFF2-40B4-BE49-F238E27FC236}">
-                <a16:creationId xmlns:a16="http://schemas.microsoft.com/office/drawing/2014/main" xmlns="" id="{BBCC9EDE-B044-4A77-94F4-DBA1744111C3}"/>
+                <a16:creationId xmlns:a16="http://schemas.microsoft.com/office/drawing/2014/main" id="{BBCC9EDE-B044-4A77-94F4-DBA1744111C3}"/>
               </a:ext>
             </a:extLst>
           </p:cNvPr>
@@ -4187,7 +4190,7 @@
           <p:cNvPr id="80" name="TextBox 79">
             <a:extLst>
               <a:ext uri="{FF2B5EF4-FFF2-40B4-BE49-F238E27FC236}">
-                <a16:creationId xmlns:a16="http://schemas.microsoft.com/office/drawing/2014/main" xmlns="" id="{21B64583-E187-489E-885D-8285E352E726}"/>
+                <a16:creationId xmlns:a16="http://schemas.microsoft.com/office/drawing/2014/main" id="{21B64583-E187-489E-885D-8285E352E726}"/>
               </a:ext>
             </a:extLst>
           </p:cNvPr>
@@ -4232,7 +4235,7 @@
           <p:cNvPr id="81" name="TextBox 80">
             <a:extLst>
               <a:ext uri="{FF2B5EF4-FFF2-40B4-BE49-F238E27FC236}">
-                <a16:creationId xmlns:a16="http://schemas.microsoft.com/office/drawing/2014/main" xmlns="" id="{DB462E42-1049-4974-B905-8C4DAD2538B6}"/>
+                <a16:creationId xmlns:a16="http://schemas.microsoft.com/office/drawing/2014/main" id="{DB462E42-1049-4974-B905-8C4DAD2538B6}"/>
               </a:ext>
             </a:extLst>
           </p:cNvPr>
@@ -4325,7 +4328,7 @@
           <p:cNvPr id="98" name="Straight Connector 97">
             <a:extLst>
               <a:ext uri="{FF2B5EF4-FFF2-40B4-BE49-F238E27FC236}">
-                <a16:creationId xmlns:a16="http://schemas.microsoft.com/office/drawing/2014/main" xmlns="" id="{6B2EC13D-5CC3-4BF8-87FD-901306AA03EE}"/>
+                <a16:creationId xmlns:a16="http://schemas.microsoft.com/office/drawing/2014/main" id="{6B2EC13D-5CC3-4BF8-87FD-901306AA03EE}"/>
               </a:ext>
             </a:extLst>
           </p:cNvPr>
@@ -4357,7 +4360,7 @@
           <p:cNvPr id="99" name="Group 98">
             <a:extLst>
               <a:ext uri="{FF2B5EF4-FFF2-40B4-BE49-F238E27FC236}">
-                <a16:creationId xmlns:a16="http://schemas.microsoft.com/office/drawing/2014/main" xmlns="" id="{7191D37A-293F-438C-B6D6-9F77DA823AD1}"/>
+                <a16:creationId xmlns:a16="http://schemas.microsoft.com/office/drawing/2014/main" id="{7191D37A-293F-438C-B6D6-9F77DA823AD1}"/>
               </a:ext>
             </a:extLst>
           </p:cNvPr>
@@ -4377,7 +4380,7 @@
             <p:cNvPr id="100" name="Rounded Rectangle 154">
               <a:extLst>
                 <a:ext uri="{FF2B5EF4-FFF2-40B4-BE49-F238E27FC236}">
-                  <a16:creationId xmlns:a16="http://schemas.microsoft.com/office/drawing/2014/main" xmlns="" id="{4403E210-A794-4C6F-9B5C-28A004866A41}"/>
+                  <a16:creationId xmlns:a16="http://schemas.microsoft.com/office/drawing/2014/main" id="{4403E210-A794-4C6F-9B5C-28A004866A41}"/>
                 </a:ext>
               </a:extLst>
             </p:cNvPr>
@@ -4444,7 +4447,7 @@
             <p:cNvPr id="101" name="Rounded Rectangle 155">
               <a:extLst>
                 <a:ext uri="{FF2B5EF4-FFF2-40B4-BE49-F238E27FC236}">
-                  <a16:creationId xmlns:a16="http://schemas.microsoft.com/office/drawing/2014/main" xmlns="" id="{20773007-BBB4-4639-905B-8DEDC04824C3}"/>
+                  <a16:creationId xmlns:a16="http://schemas.microsoft.com/office/drawing/2014/main" id="{20773007-BBB4-4639-905B-8DEDC04824C3}"/>
                 </a:ext>
               </a:extLst>
             </p:cNvPr>
@@ -4511,7 +4514,7 @@
             <p:cNvPr id="102" name="Group 101">
               <a:extLst>
                 <a:ext uri="{FF2B5EF4-FFF2-40B4-BE49-F238E27FC236}">
-                  <a16:creationId xmlns:a16="http://schemas.microsoft.com/office/drawing/2014/main" xmlns="" id="{987EC9B2-5AC1-40E7-86AC-B5FBE31921CB}"/>
+                  <a16:creationId xmlns:a16="http://schemas.microsoft.com/office/drawing/2014/main" id="{987EC9B2-5AC1-40E7-86AC-B5FBE31921CB}"/>
                 </a:ext>
               </a:extLst>
             </p:cNvPr>
@@ -4531,7 +4534,7 @@
               <p:cNvPr id="103" name="Straight Arrow Connector 102">
                 <a:extLst>
                   <a:ext uri="{FF2B5EF4-FFF2-40B4-BE49-F238E27FC236}">
-                    <a16:creationId xmlns:a16="http://schemas.microsoft.com/office/drawing/2014/main" xmlns="" id="{DC2D8D3F-2563-4883-81DC-395F453972B0}"/>
+                    <a16:creationId xmlns:a16="http://schemas.microsoft.com/office/drawing/2014/main" id="{DC2D8D3F-2563-4883-81DC-395F453972B0}"/>
                   </a:ext>
                 </a:extLst>
               </p:cNvPr>
@@ -4566,7 +4569,7 @@
               <p:cNvPr id="105" name="Straight Arrow Connector 104">
                 <a:extLst>
                   <a:ext uri="{FF2B5EF4-FFF2-40B4-BE49-F238E27FC236}">
-                    <a16:creationId xmlns:a16="http://schemas.microsoft.com/office/drawing/2014/main" xmlns="" id="{18BBE7D9-F636-4D0E-973F-D6C0F933D354}"/>
+                    <a16:creationId xmlns:a16="http://schemas.microsoft.com/office/drawing/2014/main" id="{18BBE7D9-F636-4D0E-973F-D6C0F933D354}"/>
                   </a:ext>
                 </a:extLst>
               </p:cNvPr>
@@ -4603,7 +4606,7 @@
           <p:cNvPr id="106" name="TextBox 105">
             <a:extLst>
               <a:ext uri="{FF2B5EF4-FFF2-40B4-BE49-F238E27FC236}">
-                <a16:creationId xmlns:a16="http://schemas.microsoft.com/office/drawing/2014/main" xmlns="" id="{C4132FCE-9D54-48FA-AFB2-12C11887095B}"/>
+                <a16:creationId xmlns:a16="http://schemas.microsoft.com/office/drawing/2014/main" id="{C4132FCE-9D54-48FA-AFB2-12C11887095B}"/>
               </a:ext>
             </a:extLst>
           </p:cNvPr>

</xml_diff>